<commit_message>
Updated pdfs to share (Columbia)
</commit_message>
<xml_diff>
--- a/20241217_Columbia/final/01_DES.pptx
+++ b/20241217_Columbia/final/01_DES.pptx
@@ -20568,15 +20568,6 @@
 </file>
 
 <file path=customXml/item1.xml><?xml version="1.0" encoding="utf-8"?>
-<?mso-contentType ?>
-<FormTemplates xmlns="http://schemas.microsoft.com/sharepoint/v3/contenttype/forms">
-  <Display>DocumentLibraryForm</Display>
-  <Edit>DocumentLibraryForm</Edit>
-  <New>DocumentLibraryForm</New>
-</FormTemplates>
-</file>
-
-<file path=customXml/item2.xml><?xml version="1.0" encoding="utf-8"?>
 <ct:contentTypeSchema xmlns:ct="http://schemas.microsoft.com/office/2006/metadata/contentType" xmlns:ma="http://schemas.microsoft.com/office/2006/metadata/properties/metaAttributes" ct:_="" ma:_="" ma:contentTypeName="Document" ma:contentTypeID="0x0101007069032936BB004A979B3FCE77DE1EB1" ma:contentTypeVersion="16" ma:contentTypeDescription="Create a new document." ma:contentTypeScope="" ma:versionID="59b39aa881a230c9f06045ed60478b88">
   <xsd:schema xmlns:xsd="http://www.w3.org/2001/XMLSchema" xmlns:xs="http://www.w3.org/2001/XMLSchema" xmlns:p="http://schemas.microsoft.com/office/2006/metadata/properties" xmlns:ns2="33f92c16-e346-46b5-ac57-2b519ac4cf68" xmlns:ns3="0efde304-9646-43d8-8eee-5b1a55ab17f1" xmlns:ns4="b6c9d19c-b34a-4cf4-8ebf-64c63fc48083" targetNamespace="http://schemas.microsoft.com/office/2006/metadata/properties" ma:root="true" ma:fieldsID="c596c03b60b8e16cee14ab235af6374a" ns2:_="" ns3:_="" ns4:_="">
     <xsd:import namespace="33f92c16-e346-46b5-ac57-2b519ac4cf68"/>
@@ -20816,6 +20807,15 @@
 </ct:contentTypeSchema>
 </file>
 
+<file path=customXml/item2.xml><?xml version="1.0" encoding="utf-8"?>
+<?mso-contentType ?>
+<FormTemplates xmlns="http://schemas.microsoft.com/sharepoint/v3/contenttype/forms">
+  <Display>DocumentLibraryForm</Display>
+  <Edit>DocumentLibraryForm</Edit>
+  <New>DocumentLibraryForm</New>
+</FormTemplates>
+</file>
+
 <file path=customXml/item3.xml><?xml version="1.0" encoding="utf-8"?>
 <p:properties xmlns:p="http://schemas.microsoft.com/office/2006/metadata/properties" xmlns:xsi="http://www.w3.org/2001/XMLSchema-instance" xmlns:pc="http://schemas.microsoft.com/office/infopath/2007/PartnerControls">
   <documentManagement>
@@ -20828,14 +20828,6 @@
 </file>
 
 <file path=customXml/itemProps1.xml><?xml version="1.0" encoding="utf-8"?>
-<ds:datastoreItem xmlns:ds="http://schemas.openxmlformats.org/officeDocument/2006/customXml" ds:itemID="{EF0BFC65-ABD5-40EA-BAE0-821B9D6524E8}">
-  <ds:schemaRefs>
-    <ds:schemaRef ds:uri="http://schemas.microsoft.com/sharepoint/v3/contenttype/forms"/>
-  </ds:schemaRefs>
-</ds:datastoreItem>
-</file>
-
-<file path=customXml/itemProps2.xml><?xml version="1.0" encoding="utf-8"?>
 <ds:datastoreItem xmlns:ds="http://schemas.openxmlformats.org/officeDocument/2006/customXml" ds:itemID="{2D7DA705-6300-4113-B183-485198D9C84E}">
   <ds:schemaRefs>
     <ds:schemaRef ds:uri="0efde304-9646-43d8-8eee-5b1a55ab17f1"/>
@@ -20851,6 +20843,14 @@
     <ds:schemaRef ds:uri="http://schemas.microsoft.com/office/infopath/2007/PartnerControls"/>
     <ds:schemaRef ds:uri="http://schemas.openxmlformats.org/package/2006/metadata/core-properties"/>
     <ds:schemaRef ds:uri="http://www.w3.org/2001/XMLSchema"/>
+  </ds:schemaRefs>
+</ds:datastoreItem>
+</file>
+
+<file path=customXml/itemProps2.xml><?xml version="1.0" encoding="utf-8"?>
+<ds:datastoreItem xmlns:ds="http://schemas.openxmlformats.org/officeDocument/2006/customXml" ds:itemID="{EF0BFC65-ABD5-40EA-BAE0-821B9D6524E8}">
+  <ds:schemaRefs>
+    <ds:schemaRef ds:uri="http://schemas.microsoft.com/sharepoint/v3/contenttype/forms"/>
   </ds:schemaRefs>
 </ds:datastoreItem>
 </file>

</xml_diff>